<commit_message>
Auto stash before merge of "main" and "origin/main"
</commit_message>
<xml_diff>
--- a/Aurkezpena/AurkezpenaTaldea5.pptx
+++ b/Aurkezpena/AurkezpenaTaldea5.pptx
@@ -5,10 +5,10 @@
     <p:sldMasterId id="2147483678" r:id="rId1"/>
   </p:sldMasterIdLst>
   <p:notesMasterIdLst>
-    <p:notesMasterId r:id="rId17"/>
+    <p:notesMasterId r:id="rId18"/>
   </p:notesMasterIdLst>
   <p:handoutMasterIdLst>
-    <p:handoutMasterId r:id="rId18"/>
+    <p:handoutMasterId r:id="rId19"/>
   </p:handoutMasterIdLst>
   <p:sldIdLst>
     <p:sldId id="256" r:id="rId2"/>
@@ -18,14 +18,15 @@
     <p:sldId id="260" r:id="rId6"/>
     <p:sldId id="261" r:id="rId7"/>
     <p:sldId id="262" r:id="rId8"/>
-    <p:sldId id="263" r:id="rId9"/>
-    <p:sldId id="264" r:id="rId10"/>
-    <p:sldId id="265" r:id="rId11"/>
-    <p:sldId id="266" r:id="rId12"/>
-    <p:sldId id="267" r:id="rId13"/>
-    <p:sldId id="268" r:id="rId14"/>
-    <p:sldId id="269" r:id="rId15"/>
-    <p:sldId id="270" r:id="rId16"/>
+    <p:sldId id="270" r:id="rId9"/>
+    <p:sldId id="271" r:id="rId10"/>
+    <p:sldId id="272" r:id="rId11"/>
+    <p:sldId id="273" r:id="rId12"/>
+    <p:sldId id="274" r:id="rId13"/>
+    <p:sldId id="265" r:id="rId14"/>
+    <p:sldId id="266" r:id="rId15"/>
+    <p:sldId id="267" r:id="rId16"/>
+    <p:sldId id="269" r:id="rId17"/>
   </p:sldIdLst>
   <p:sldSz cx="12192000" cy="6858000"/>
   <p:notesSz cx="6858000" cy="9144000"/>
@@ -214,7 +215,7 @@
           <a:p>
             <a:fld id="{8CB793CB-A906-4173-AD9E-70881889E7EC}" type="datetime1">
               <a:rPr lang="es-ES" smtClean="0"/>
-              <a:t>20/03/2024</a:t>
+              <a:t>19/03/2024</a:t>
             </a:fld>
             <a:endParaRPr lang="es-ES"/>
           </a:p>
@@ -384,7 +385,7 @@
           <a:p>
             <a:fld id="{13999672-DF21-411C-B199-9EBD2DD5FEEF}" type="datetime1">
               <a:rPr lang="es-ES" smtClean="0"/>
-              <a:t>20/03/2024</a:t>
+              <a:t>19/03/2024</a:t>
             </a:fld>
             <a:endParaRPr lang="es-ES"/>
           </a:p>
@@ -26260,8 +26261,630 @@
           <a:lstStyle/>
           <a:p>
             <a:r>
+              <a:rPr lang="eu-ES" dirty="0" smtClean="0"/>
+              <a:t>Oracleren instalazioa zerbitzarian</a:t>
+            </a:r>
+            <a:endParaRPr lang="es-ES" dirty="0"/>
+          </a:p>
+        </p:txBody>
+      </p:sp>
+      <p:sp>
+        <p:nvSpPr>
+          <p:cNvPr id="4" name="Testuaren leku-marka 3"/>
+          <p:cNvSpPr>
+            <a:spLocks noGrp="1"/>
+          </p:cNvSpPr>
+          <p:nvPr>
+            <p:ph type="body" sz="half" idx="2"/>
+          </p:nvPr>
+        </p:nvSpPr>
+        <p:spPr/>
+        <p:txBody>
+          <a:bodyPr/>
+          <a:lstStyle/>
+          <a:p>
+            <a:endParaRPr lang="es-ES"/>
+          </a:p>
+        </p:txBody>
+      </p:sp>
+      <p:sp>
+        <p:nvSpPr>
+          <p:cNvPr id="5" name="TestuKoadroa 4"/>
+          <p:cNvSpPr txBox="1"/>
+          <p:nvPr/>
+        </p:nvSpPr>
+        <p:spPr>
+          <a:xfrm>
+            <a:off x="698643" y="1469204"/>
+            <a:ext cx="6072027" cy="646331"/>
+          </a:xfrm>
+          <a:prstGeom prst="rect">
+            <a:avLst/>
+          </a:prstGeom>
+          <a:noFill/>
+        </p:spPr>
+        <p:txBody>
+          <a:bodyPr wrap="square" rtlCol="0">
+            <a:spAutoFit/>
+          </a:bodyPr>
+          <a:lstStyle/>
+          <a:p>
+            <a:r>
+              <a:rPr lang="eu-ES" dirty="0" smtClean="0"/>
+              <a:t>Karpeta konpartituak aprobetxatuz Oracle instalatu da zerbitzarian. </a:t>
+            </a:r>
+            <a:endParaRPr lang="es-ES" dirty="0"/>
+          </a:p>
+        </p:txBody>
+      </p:sp>
+    </p:spTree>
+    <p:extLst>
+      <p:ext uri="{BB962C8B-B14F-4D97-AF65-F5344CB8AC3E}">
+        <p14:creationId xmlns:p14="http://schemas.microsoft.com/office/powerpoint/2010/main" val="3624774641"/>
+      </p:ext>
+    </p:extLst>
+  </p:cSld>
+  <p:clrMapOvr>
+    <a:masterClrMapping/>
+  </p:clrMapOvr>
+</p:sld>
+</file>
+
+<file path=ppt/slides/slide11.xml><?xml version="1.0" encoding="utf-8"?>
+<p:sld xmlns:a="http://schemas.openxmlformats.org/drawingml/2006/main" xmlns:r="http://schemas.openxmlformats.org/officeDocument/2006/relationships" xmlns:p="http://schemas.openxmlformats.org/presentationml/2006/main">
+  <p:cSld>
+    <p:spTree>
+      <p:nvGrpSpPr>
+        <p:cNvPr id="1" name=""/>
+        <p:cNvGrpSpPr/>
+        <p:nvPr/>
+      </p:nvGrpSpPr>
+      <p:grpSpPr>
+        <a:xfrm>
+          <a:off x="0" y="0"/>
+          <a:ext cx="0" cy="0"/>
+          <a:chOff x="0" y="0"/>
+          <a:chExt cx="0" cy="0"/>
+        </a:xfrm>
+      </p:grpSpPr>
+      <p:sp>
+        <p:nvSpPr>
+          <p:cNvPr id="2" name="Titulua 1"/>
+          <p:cNvSpPr>
+            <a:spLocks noGrp="1"/>
+          </p:cNvSpPr>
+          <p:nvPr>
+            <p:ph type="title"/>
+          </p:nvPr>
+        </p:nvSpPr>
+        <p:spPr/>
+        <p:txBody>
+          <a:bodyPr/>
+          <a:lstStyle/>
+          <a:p>
+            <a:r>
+              <a:rPr lang="es-ES" dirty="0" err="1" smtClean="0"/>
+              <a:t>Oracleko</a:t>
+            </a:r>
+            <a:r>
+              <a:rPr lang="es-ES" dirty="0" smtClean="0"/>
+              <a:t> </a:t>
+            </a:r>
+            <a:r>
+              <a:rPr lang="es-ES" dirty="0" err="1" smtClean="0"/>
+              <a:t>erabiltzailea</a:t>
+            </a:r>
+            <a:r>
+              <a:rPr lang="es-ES" dirty="0" smtClean="0"/>
+              <a:t> </a:t>
+            </a:r>
+            <a:r>
+              <a:rPr lang="es-ES" dirty="0" err="1" smtClean="0"/>
+              <a:t>sortu</a:t>
+            </a:r>
+            <a:endParaRPr lang="es-ES" dirty="0"/>
+          </a:p>
+        </p:txBody>
+      </p:sp>
+      <p:sp>
+        <p:nvSpPr>
+          <p:cNvPr id="5" name="TestuKoadroa 4"/>
+          <p:cNvSpPr txBox="1"/>
+          <p:nvPr/>
+        </p:nvSpPr>
+        <p:spPr>
+          <a:xfrm>
+            <a:off x="5104014" y="1554480"/>
+            <a:ext cx="5993477" cy="4247317"/>
+          </a:xfrm>
+          <a:prstGeom prst="rect">
+            <a:avLst/>
+          </a:prstGeom>
+          <a:noFill/>
+        </p:spPr>
+        <p:txBody>
+          <a:bodyPr wrap="square" rtlCol="0">
+            <a:spAutoFit/>
+          </a:bodyPr>
+          <a:lstStyle/>
+          <a:p>
+            <a:r>
+              <a:rPr lang="eu-ES" dirty="0" smtClean="0"/>
+              <a:t>Oracle instalatu ondoren Oracleko erabiltzailea sortu behar da.</a:t>
+            </a:r>
+          </a:p>
+          <a:p>
+            <a:endParaRPr lang="eu-ES" dirty="0"/>
+          </a:p>
+          <a:p>
+            <a:endParaRPr lang="eu-ES" dirty="0" smtClean="0"/>
+          </a:p>
+          <a:p>
+            <a:endParaRPr lang="eu-ES" dirty="0"/>
+          </a:p>
+          <a:p>
+            <a:pPr marL="285750" indent="-285750">
+              <a:buFontTx/>
+              <a:buChar char="-"/>
+            </a:pPr>
+            <a:r>
+              <a:rPr lang="eu-ES" dirty="0" smtClean="0"/>
+              <a:t>Erabiltzailea sortu.</a:t>
+            </a:r>
+          </a:p>
+          <a:p>
+            <a:endParaRPr lang="eu-ES" dirty="0" smtClean="0"/>
+          </a:p>
+          <a:p>
+            <a:pPr marL="285750" indent="-285750">
+              <a:buFontTx/>
+              <a:buChar char="-"/>
+            </a:pPr>
+            <a:endParaRPr lang="eu-ES" dirty="0"/>
+          </a:p>
+          <a:p>
+            <a:pPr marL="285750" indent="-285750">
+              <a:buFontTx/>
+              <a:buChar char="-"/>
+            </a:pPr>
+            <a:r>
+              <a:rPr lang="eu-ES" dirty="0" smtClean="0"/>
+              <a:t>Administratzaile rola eman.</a:t>
+            </a:r>
+          </a:p>
+          <a:p>
+            <a:pPr marL="285750" indent="-285750">
+              <a:buFontTx/>
+              <a:buChar char="-"/>
+            </a:pPr>
+            <a:endParaRPr lang="eu-ES" dirty="0"/>
+          </a:p>
+          <a:p>
+            <a:pPr marL="285750" indent="-285750">
+              <a:buFontTx/>
+              <a:buChar char="-"/>
+            </a:pPr>
+            <a:endParaRPr lang="eu-ES" dirty="0" smtClean="0"/>
+          </a:p>
+          <a:p>
+            <a:pPr marL="285750" indent="-285750">
+              <a:buFontTx/>
+              <a:buChar char="-"/>
+            </a:pPr>
+            <a:r>
+              <a:rPr lang="eu-ES" dirty="0" smtClean="0"/>
+              <a:t>Erabiltzailea desblokeatu</a:t>
+            </a:r>
+          </a:p>
+          <a:p>
+            <a:pPr marL="285750" indent="-285750">
+              <a:buFontTx/>
+              <a:buChar char="-"/>
+            </a:pPr>
+            <a:endParaRPr lang="eu-ES" dirty="0"/>
+          </a:p>
+          <a:p>
+            <a:pPr marL="285750" indent="-285750">
+              <a:buFontTx/>
+              <a:buChar char="-"/>
+            </a:pPr>
+            <a:endParaRPr lang="eu-ES" dirty="0" smtClean="0"/>
+          </a:p>
+          <a:p>
+            <a:pPr marL="285750" indent="-285750">
+              <a:buFontTx/>
+              <a:buChar char="-"/>
+            </a:pPr>
+            <a:r>
+              <a:rPr lang="eu-ES" dirty="0" smtClean="0"/>
+              <a:t>Sesioa irekitzeko baimena eman</a:t>
+            </a:r>
+            <a:endParaRPr lang="es-ES" dirty="0"/>
+          </a:p>
+        </p:txBody>
+      </p:sp>
+      <p:pic>
+        <p:nvPicPr>
+          <p:cNvPr id="6" name="Irudia 5"/>
+          <p:cNvPicPr/>
+          <p:nvPr/>
+        </p:nvPicPr>
+        <p:blipFill>
+          <a:blip r:embed="rId2"/>
+          <a:stretch>
+            <a:fillRect/>
+          </a:stretch>
+        </p:blipFill>
+        <p:spPr>
+          <a:xfrm>
+            <a:off x="7791278" y="2877705"/>
+            <a:ext cx="3143250" cy="520700"/>
+          </a:xfrm>
+          <a:prstGeom prst="rect">
+            <a:avLst/>
+          </a:prstGeom>
+        </p:spPr>
+      </p:pic>
+      <p:pic>
+        <p:nvPicPr>
+          <p:cNvPr id="7" name="Irudia 6"/>
+          <p:cNvPicPr/>
+          <p:nvPr/>
+        </p:nvPicPr>
+        <p:blipFill>
+          <a:blip r:embed="rId3"/>
+          <a:stretch>
+            <a:fillRect/>
+          </a:stretch>
+        </p:blipFill>
+        <p:spPr>
+          <a:xfrm>
+            <a:off x="8385030" y="3695162"/>
+            <a:ext cx="2238375" cy="543560"/>
+          </a:xfrm>
+          <a:prstGeom prst="rect">
+            <a:avLst/>
+          </a:prstGeom>
+        </p:spPr>
+      </p:pic>
+      <p:pic>
+        <p:nvPicPr>
+          <p:cNvPr id="8" name="Irudia 7"/>
+          <p:cNvPicPr/>
+          <p:nvPr/>
+        </p:nvPicPr>
+        <p:blipFill>
+          <a:blip r:embed="rId4"/>
+          <a:stretch>
+            <a:fillRect/>
+          </a:stretch>
+        </p:blipFill>
+        <p:spPr>
+          <a:xfrm>
+            <a:off x="8482878" y="4528769"/>
+            <a:ext cx="2790825" cy="491490"/>
+          </a:xfrm>
+          <a:prstGeom prst="rect">
+            <a:avLst/>
+          </a:prstGeom>
+        </p:spPr>
+      </p:pic>
+      <p:pic>
+        <p:nvPicPr>
+          <p:cNvPr id="9" name="Irudia 8"/>
+          <p:cNvPicPr/>
+          <p:nvPr/>
+        </p:nvPicPr>
+        <p:blipFill>
+          <a:blip r:embed="rId5"/>
+          <a:stretch>
+            <a:fillRect/>
+          </a:stretch>
+        </p:blipFill>
+        <p:spPr>
+          <a:xfrm>
+            <a:off x="9126855" y="5310306"/>
+            <a:ext cx="2533650" cy="558800"/>
+          </a:xfrm>
+          <a:prstGeom prst="rect">
+            <a:avLst/>
+          </a:prstGeom>
+        </p:spPr>
+      </p:pic>
+    </p:spTree>
+    <p:extLst>
+      <p:ext uri="{BB962C8B-B14F-4D97-AF65-F5344CB8AC3E}">
+        <p14:creationId xmlns:p14="http://schemas.microsoft.com/office/powerpoint/2010/main" val="570147161"/>
+      </p:ext>
+    </p:extLst>
+  </p:cSld>
+  <p:clrMapOvr>
+    <a:masterClrMapping/>
+  </p:clrMapOvr>
+  <p:timing>
+    <p:tnLst>
+      <p:par>
+        <p:cTn id="1" dur="indefinite" restart="never" nodeType="tmRoot"/>
+      </p:par>
+    </p:tnLst>
+  </p:timing>
+</p:sld>
+</file>
+
+<file path=ppt/slides/slide12.xml><?xml version="1.0" encoding="utf-8"?>
+<p:sld xmlns:a="http://schemas.openxmlformats.org/drawingml/2006/main" xmlns:r="http://schemas.openxmlformats.org/officeDocument/2006/relationships" xmlns:p="http://schemas.openxmlformats.org/presentationml/2006/main">
+  <p:cSld>
+    <p:spTree>
+      <p:nvGrpSpPr>
+        <p:cNvPr id="1" name=""/>
+        <p:cNvGrpSpPr/>
+        <p:nvPr/>
+      </p:nvGrpSpPr>
+      <p:grpSpPr>
+        <a:xfrm>
+          <a:off x="0" y="0"/>
+          <a:ext cx="0" cy="0"/>
+          <a:chOff x="0" y="0"/>
+          <a:chExt cx="0" cy="0"/>
+        </a:xfrm>
+      </p:grpSpPr>
+      <p:sp>
+        <p:nvSpPr>
+          <p:cNvPr id="2" name="Titulua 1"/>
+          <p:cNvSpPr>
+            <a:spLocks noGrp="1"/>
+          </p:cNvSpPr>
+          <p:nvPr>
+            <p:ph type="title"/>
+          </p:nvPr>
+        </p:nvSpPr>
+        <p:spPr/>
+        <p:txBody>
+          <a:bodyPr/>
+          <a:lstStyle/>
+          <a:p>
+            <a:r>
+              <a:rPr lang="eu-ES" dirty="0" smtClean="0"/>
+              <a:t>SQL-tik Oraclera DB migratu</a:t>
+            </a:r>
+            <a:endParaRPr lang="es-ES" dirty="0"/>
+          </a:p>
+        </p:txBody>
+      </p:sp>
+      <p:sp>
+        <p:nvSpPr>
+          <p:cNvPr id="4" name="Testuaren leku-marka 3"/>
+          <p:cNvSpPr>
+            <a:spLocks noGrp="1"/>
+          </p:cNvSpPr>
+          <p:nvPr>
+            <p:ph type="body" sz="half" idx="2"/>
+          </p:nvPr>
+        </p:nvSpPr>
+        <p:spPr/>
+        <p:txBody>
+          <a:bodyPr/>
+          <a:lstStyle/>
+          <a:p>
+            <a:endParaRPr lang="es-ES"/>
+          </a:p>
+        </p:txBody>
+      </p:sp>
+      <p:sp>
+        <p:nvSpPr>
+          <p:cNvPr id="5" name="TestuKoadroa 4"/>
+          <p:cNvSpPr txBox="1"/>
+          <p:nvPr/>
+        </p:nvSpPr>
+        <p:spPr>
+          <a:xfrm>
+            <a:off x="1350847" y="727493"/>
+            <a:ext cx="4364182" cy="923330"/>
+          </a:xfrm>
+          <a:prstGeom prst="rect">
+            <a:avLst/>
+          </a:prstGeom>
+          <a:noFill/>
+        </p:spPr>
+        <p:txBody>
+          <a:bodyPr wrap="square" rtlCol="0">
+            <a:spAutoFit/>
+          </a:bodyPr>
+          <a:lstStyle/>
+          <a:p>
+            <a:r>
+              <a:rPr lang="eu-ES" dirty="0" smtClean="0"/>
+              <a:t>Enpresako DB-a </a:t>
+            </a:r>
+            <a:r>
+              <a:rPr lang="eu-ES" dirty="0" err="1" smtClean="0"/>
+              <a:t>MySQL</a:t>
+            </a:r>
+            <a:r>
+              <a:rPr lang="eu-ES" dirty="0" smtClean="0"/>
+              <a:t> genuen eta hau </a:t>
+            </a:r>
+            <a:r>
+              <a:rPr lang="eu-ES" dirty="0"/>
+              <a:t>O</a:t>
+            </a:r>
+            <a:r>
+              <a:rPr lang="eu-ES" dirty="0" smtClean="0"/>
+              <a:t>raclen landu nahi dugunez DB-a migratu egin behar da.</a:t>
+            </a:r>
+            <a:endParaRPr lang="es-ES" dirty="0"/>
+          </a:p>
+        </p:txBody>
+      </p:sp>
+      <p:pic>
+        <p:nvPicPr>
+          <p:cNvPr id="6" name="Irudia 5"/>
+          <p:cNvPicPr/>
+          <p:nvPr/>
+        </p:nvPicPr>
+        <p:blipFill>
+          <a:blip r:embed="rId2"/>
+          <a:stretch>
+            <a:fillRect/>
+          </a:stretch>
+        </p:blipFill>
+        <p:spPr>
+          <a:xfrm>
+            <a:off x="284064" y="1756188"/>
+            <a:ext cx="3038070" cy="1878677"/>
+          </a:xfrm>
+          <a:prstGeom prst="rect">
+            <a:avLst/>
+          </a:prstGeom>
+        </p:spPr>
+      </p:pic>
+      <p:pic>
+        <p:nvPicPr>
+          <p:cNvPr id="7" name="Irudia 6"/>
+          <p:cNvPicPr/>
+          <p:nvPr/>
+        </p:nvPicPr>
+        <p:blipFill>
+          <a:blip r:embed="rId3"/>
+          <a:stretch>
+            <a:fillRect/>
+          </a:stretch>
+        </p:blipFill>
+        <p:spPr>
+          <a:xfrm>
+            <a:off x="3578656" y="1650823"/>
+            <a:ext cx="3300123" cy="2139783"/>
+          </a:xfrm>
+          <a:prstGeom prst="rect">
+            <a:avLst/>
+          </a:prstGeom>
+        </p:spPr>
+      </p:pic>
+      <p:pic>
+        <p:nvPicPr>
+          <p:cNvPr id="8" name="Irudia 7"/>
+          <p:cNvPicPr/>
+          <p:nvPr/>
+        </p:nvPicPr>
+        <p:blipFill>
+          <a:blip r:embed="rId4"/>
+          <a:stretch>
+            <a:fillRect/>
+          </a:stretch>
+        </p:blipFill>
+        <p:spPr>
+          <a:xfrm>
+            <a:off x="3183775" y="4256117"/>
+            <a:ext cx="2557042" cy="2044932"/>
+          </a:xfrm>
+          <a:prstGeom prst="rect">
+            <a:avLst/>
+          </a:prstGeom>
+        </p:spPr>
+      </p:pic>
+      <p:pic>
+        <p:nvPicPr>
+          <p:cNvPr id="9" name="Irudia 8"/>
+          <p:cNvPicPr/>
+          <p:nvPr/>
+        </p:nvPicPr>
+        <p:blipFill>
+          <a:blip r:embed="rId5"/>
+          <a:stretch>
+            <a:fillRect/>
+          </a:stretch>
+        </p:blipFill>
+        <p:spPr>
+          <a:xfrm>
+            <a:off x="6084916" y="4505498"/>
+            <a:ext cx="2795617" cy="2036619"/>
+          </a:xfrm>
+          <a:prstGeom prst="rect">
+            <a:avLst/>
+          </a:prstGeom>
+        </p:spPr>
+      </p:pic>
+      <p:pic>
+        <p:nvPicPr>
+          <p:cNvPr id="10" name="Irudia 9"/>
+          <p:cNvPicPr/>
+          <p:nvPr/>
+        </p:nvPicPr>
+        <p:blipFill>
+          <a:blip r:embed="rId6"/>
+          <a:stretch>
+            <a:fillRect/>
+          </a:stretch>
+        </p:blipFill>
+        <p:spPr>
+          <a:xfrm>
+            <a:off x="91441" y="4355482"/>
+            <a:ext cx="2992582" cy="1846202"/>
+          </a:xfrm>
+          <a:prstGeom prst="rect">
+            <a:avLst/>
+          </a:prstGeom>
+        </p:spPr>
+      </p:pic>
+    </p:spTree>
+    <p:extLst>
+      <p:ext uri="{BB962C8B-B14F-4D97-AF65-F5344CB8AC3E}">
+        <p14:creationId xmlns:p14="http://schemas.microsoft.com/office/powerpoint/2010/main" val="447940374"/>
+      </p:ext>
+    </p:extLst>
+  </p:cSld>
+  <p:clrMapOvr>
+    <a:masterClrMapping/>
+  </p:clrMapOvr>
+  <p:timing>
+    <p:tnLst>
+      <p:par>
+        <p:cTn id="1" dur="indefinite" restart="never" nodeType="tmRoot"/>
+      </p:par>
+    </p:tnLst>
+  </p:timing>
+</p:sld>
+</file>
+
+<file path=ppt/slides/slide13.xml><?xml version="1.0" encoding="utf-8"?>
+<p:sld xmlns:a="http://schemas.openxmlformats.org/drawingml/2006/main" xmlns:r="http://schemas.openxmlformats.org/officeDocument/2006/relationships" xmlns:p="http://schemas.openxmlformats.org/presentationml/2006/main">
+  <p:cSld>
+    <p:spTree>
+      <p:nvGrpSpPr>
+        <p:cNvPr id="1" name=""/>
+        <p:cNvGrpSpPr/>
+        <p:nvPr/>
+      </p:nvGrpSpPr>
+      <p:grpSpPr>
+        <a:xfrm>
+          <a:off x="0" y="0"/>
+          <a:ext cx="0" cy="0"/>
+          <a:chOff x="0" y="0"/>
+          <a:chExt cx="0" cy="0"/>
+        </a:xfrm>
+      </p:grpSpPr>
+      <p:sp>
+        <p:nvSpPr>
+          <p:cNvPr id="2" name="Titulua 1"/>
+          <p:cNvSpPr>
+            <a:spLocks noGrp="1"/>
+          </p:cNvSpPr>
+          <p:nvPr>
+            <p:ph type="title"/>
+          </p:nvPr>
+        </p:nvSpPr>
+        <p:spPr/>
+        <p:txBody>
+          <a:bodyPr/>
+          <a:lstStyle/>
+          <a:p>
+            <a:r>
               <a:rPr lang="eu-ES" sz="3100" dirty="0" smtClean="0"/>
-              <a:t>BD-ko datuak XML-ra pasa</a:t>
+              <a:t>BD-ko datuak XML-ra </a:t>
+            </a:r>
+            <a:r>
+              <a:rPr lang="eu-ES" sz="3100" dirty="0" smtClean="0"/>
+              <a:t>pasa era automatikoan</a:t>
             </a:r>
             <a:endParaRPr lang="es-ES" sz="3100" dirty="0"/>
           </a:p>
@@ -26318,7 +26941,7 @@
 </p:sld>
 </file>
 
-<file path=ppt/slides/slide11.xml><?xml version="1.0" encoding="utf-8"?>
+<file path=ppt/slides/slide14.xml><?xml version="1.0" encoding="utf-8"?>
 <p:sld xmlns:a="http://schemas.openxmlformats.org/drawingml/2006/main" xmlns:r="http://schemas.openxmlformats.org/officeDocument/2006/relationships" xmlns:p="http://schemas.openxmlformats.org/presentationml/2006/main">
   <p:cSld>
     <p:spTree>
@@ -26409,7 +27032,7 @@
 </p:sld>
 </file>
 
-<file path=ppt/slides/slide12.xml><?xml version="1.0" encoding="utf-8"?>
+<file path=ppt/slides/slide15.xml><?xml version="1.0" encoding="utf-8"?>
 <p:sld xmlns:a="http://schemas.openxmlformats.org/drawingml/2006/main" xmlns:r="http://schemas.openxmlformats.org/officeDocument/2006/relationships" xmlns:p="http://schemas.openxmlformats.org/presentationml/2006/main">
   <p:cSld>
     <p:spTree>
@@ -26500,105 +27123,7 @@
 </p:sld>
 </file>
 
-<file path=ppt/slides/slide13.xml><?xml version="1.0" encoding="utf-8"?>
-<p:sld xmlns:a="http://schemas.openxmlformats.org/drawingml/2006/main" xmlns:r="http://schemas.openxmlformats.org/officeDocument/2006/relationships" xmlns:p="http://schemas.openxmlformats.org/presentationml/2006/main">
-  <p:cSld>
-    <p:spTree>
-      <p:nvGrpSpPr>
-        <p:cNvPr id="1" name=""/>
-        <p:cNvGrpSpPr/>
-        <p:nvPr/>
-      </p:nvGrpSpPr>
-      <p:grpSpPr>
-        <a:xfrm>
-          <a:off x="0" y="0"/>
-          <a:ext cx="0" cy="0"/>
-          <a:chOff x="0" y="0"/>
-          <a:chExt cx="0" cy="0"/>
-        </a:xfrm>
-      </p:grpSpPr>
-      <p:sp>
-        <p:nvSpPr>
-          <p:cNvPr id="2" name="Titulua 1"/>
-          <p:cNvSpPr>
-            <a:spLocks noGrp="1"/>
-          </p:cNvSpPr>
-          <p:nvPr>
-            <p:ph type="title"/>
-          </p:nvPr>
-        </p:nvSpPr>
-        <p:spPr/>
-        <p:txBody>
-          <a:bodyPr/>
-          <a:lstStyle/>
-          <a:p>
-            <a:r>
-              <a:rPr lang="eu-ES" dirty="0" smtClean="0"/>
-              <a:t>Arazketa</a:t>
-            </a:r>
-            <a:endParaRPr lang="es-ES" dirty="0"/>
-          </a:p>
-        </p:txBody>
-      </p:sp>
-      <p:sp>
-        <p:nvSpPr>
-          <p:cNvPr id="3" name="Edukiaren leku-marka 2"/>
-          <p:cNvSpPr>
-            <a:spLocks noGrp="1"/>
-          </p:cNvSpPr>
-          <p:nvPr>
-            <p:ph sz="half" idx="1"/>
-          </p:nvPr>
-        </p:nvSpPr>
-        <p:spPr/>
-        <p:txBody>
-          <a:bodyPr/>
-          <a:lstStyle/>
-          <a:p>
-            <a:endParaRPr lang="es-ES"/>
-          </a:p>
-        </p:txBody>
-      </p:sp>
-      <p:sp>
-        <p:nvSpPr>
-          <p:cNvPr id="4" name="Edukiaren leku-marka 3"/>
-          <p:cNvSpPr>
-            <a:spLocks noGrp="1"/>
-          </p:cNvSpPr>
-          <p:nvPr>
-            <p:ph sz="half" idx="2"/>
-          </p:nvPr>
-        </p:nvSpPr>
-        <p:spPr/>
-        <p:txBody>
-          <a:bodyPr/>
-          <a:lstStyle/>
-          <a:p>
-            <a:endParaRPr lang="es-ES"/>
-          </a:p>
-        </p:txBody>
-      </p:sp>
-    </p:spTree>
-    <p:extLst>
-      <p:ext uri="{BB962C8B-B14F-4D97-AF65-F5344CB8AC3E}">
-        <p14:creationId xmlns:p14="http://schemas.microsoft.com/office/powerpoint/2010/main" val="3303061577"/>
-      </p:ext>
-    </p:extLst>
-  </p:cSld>
-  <p:clrMapOvr>
-    <a:masterClrMapping/>
-  </p:clrMapOvr>
-  <p:timing>
-    <p:tnLst>
-      <p:par>
-        <p:cTn id="1" dur="indefinite" restart="never" nodeType="tmRoot"/>
-      </p:par>
-    </p:tnLst>
-  </p:timing>
-</p:sld>
-</file>
-
-<file path=ppt/slides/slide14.xml><?xml version="1.0" encoding="utf-8"?>
+<file path=ppt/slides/slide16.xml><?xml version="1.0" encoding="utf-8"?>
 <p:sld xmlns:a="http://schemas.openxmlformats.org/drawingml/2006/main" xmlns:r="http://schemas.openxmlformats.org/officeDocument/2006/relationships" xmlns:p="http://schemas.openxmlformats.org/presentationml/2006/main">
   <p:cSld>
     <p:spTree>
@@ -26703,7 +27228,7 @@
         </p:blipFill>
         <p:spPr>
           <a:xfrm>
-            <a:off x="1780311" y="2540639"/>
+            <a:off x="1723494" y="2529493"/>
             <a:ext cx="4316698" cy="1753312"/>
           </a:xfrm>
           <a:prstGeom prst="rect">
@@ -26751,55 +27276,6 @@
       </p:par>
     </p:tnLst>
   </p:timing>
-</p:sld>
-</file>
-
-<file path=ppt/slides/slide15.xml><?xml version="1.0" encoding="utf-8"?>
-<p:sld xmlns:a="http://schemas.openxmlformats.org/drawingml/2006/main" xmlns:r="http://schemas.openxmlformats.org/officeDocument/2006/relationships" xmlns:p="http://schemas.openxmlformats.org/presentationml/2006/main">
-  <p:cSld>
-    <p:spTree>
-      <p:nvGrpSpPr>
-        <p:cNvPr id="1" name=""/>
-        <p:cNvGrpSpPr/>
-        <p:nvPr/>
-      </p:nvGrpSpPr>
-      <p:grpSpPr>
-        <a:xfrm>
-          <a:off x="0" y="0"/>
-          <a:ext cx="0" cy="0"/>
-          <a:chOff x="0" y="0"/>
-          <a:chExt cx="0" cy="0"/>
-        </a:xfrm>
-      </p:grpSpPr>
-      <p:sp>
-        <p:nvSpPr>
-          <p:cNvPr id="2" name="Titulua 1"/>
-          <p:cNvSpPr>
-            <a:spLocks noGrp="1"/>
-          </p:cNvSpPr>
-          <p:nvPr>
-            <p:ph type="title"/>
-          </p:nvPr>
-        </p:nvSpPr>
-        <p:spPr/>
-        <p:txBody>
-          <a:bodyPr/>
-          <a:lstStyle/>
-          <a:p>
-            <a:endParaRPr lang="es-ES"/>
-          </a:p>
-        </p:txBody>
-      </p:sp>
-    </p:spTree>
-    <p:extLst>
-      <p:ext uri="{BB962C8B-B14F-4D97-AF65-F5344CB8AC3E}">
-        <p14:creationId xmlns:p14="http://schemas.microsoft.com/office/powerpoint/2010/main" val="3725255666"/>
-      </p:ext>
-    </p:extLst>
-  </p:cSld>
-  <p:clrMapOvr>
-    <a:masterClrMapping/>
-  </p:clrMapOvr>
 </p:sld>
 </file>
 
@@ -27977,24 +28453,12 @@
           <a:lstStyle/>
           <a:p>
             <a:r>
-              <a:rPr lang="eu-ES" dirty="0" smtClean="0"/>
-              <a:t>Oracle  </a:t>
+              <a:rPr lang="es-ES" dirty="0" smtClean="0"/>
+              <a:t>Ubuntu Server </a:t>
             </a:r>
             <a:r>
-              <a:rPr lang="eu-ES" dirty="0" err="1" smtClean="0"/>
-              <a:t>zerbiatzarian</a:t>
-            </a:r>
-            <a:r>
-              <a:rPr lang="eu-ES" dirty="0" smtClean="0"/>
-              <a:t> </a:t>
-            </a:r>
-            <a:r>
-              <a:rPr lang="eu-ES" dirty="0" err="1" smtClean="0"/>
-              <a:t>instalaketaeta</a:t>
-            </a:r>
-            <a:r>
-              <a:rPr lang="eu-ES" dirty="0" smtClean="0"/>
-              <a:t> konexioa</a:t>
+              <a:rPr lang="es-ES" dirty="0" err="1" smtClean="0"/>
+              <a:t>instalaketa</a:t>
             </a:r>
             <a:endParaRPr lang="es-ES" dirty="0"/>
           </a:p>
@@ -28002,52 +28466,81 @@
       </p:sp>
       <p:sp>
         <p:nvSpPr>
-          <p:cNvPr id="3" name="Edukiaren leku-marka 2"/>
-          <p:cNvSpPr>
-            <a:spLocks noGrp="1"/>
-          </p:cNvSpPr>
-          <p:nvPr>
-            <p:ph idx="1"/>
-          </p:nvPr>
+          <p:cNvPr id="3" name="TestuKoadroa 2"/>
+          <p:cNvSpPr txBox="1"/>
+          <p:nvPr/>
         </p:nvSpPr>
-        <p:spPr/>
+        <p:spPr>
+          <a:xfrm>
+            <a:off x="5599308" y="1231387"/>
+            <a:ext cx="5445410" cy="646331"/>
+          </a:xfrm>
+          <a:prstGeom prst="rect">
+            <a:avLst/>
+          </a:prstGeom>
+          <a:noFill/>
+        </p:spPr>
         <p:txBody>
-          <a:bodyPr/>
+          <a:bodyPr wrap="square" rtlCol="0">
+            <a:spAutoFit/>
+          </a:bodyPr>
           <a:lstStyle/>
           <a:p>
-            <a:endParaRPr lang="es-ES"/>
-          </a:p>
-        </p:txBody>
-      </p:sp>
-      <p:sp>
-        <p:nvSpPr>
-          <p:cNvPr id="4" name="Testuaren leku-marka 3"/>
-          <p:cNvSpPr>
-            <a:spLocks noGrp="1"/>
-          </p:cNvSpPr>
-          <p:nvPr>
-            <p:ph type="body" sz="half" idx="2"/>
-          </p:nvPr>
-        </p:nvSpPr>
-        <p:spPr/>
-        <p:txBody>
-          <a:bodyPr/>
-          <a:lstStyle/>
-          <a:p>
+            <a:r>
+              <a:rPr lang="eu-ES" dirty="0" smtClean="0"/>
+              <a:t>Ubuntu </a:t>
+            </a:r>
+            <a:r>
+              <a:rPr lang="eu-ES" dirty="0"/>
+              <a:t>S</a:t>
+            </a:r>
+            <a:r>
+              <a:rPr lang="eu-ES" dirty="0" smtClean="0"/>
+              <a:t>erver gure enpresa osatzeko sistema eragile egokiena iruditu zaigu.</a:t>
+            </a:r>
             <a:endParaRPr lang="es-ES" dirty="0"/>
           </a:p>
         </p:txBody>
       </p:sp>
+      <p:pic>
+        <p:nvPicPr>
+          <p:cNvPr id="4" name="Irudia 3"/>
+          <p:cNvPicPr/>
+          <p:nvPr/>
+        </p:nvPicPr>
+        <p:blipFill>
+          <a:blip r:embed="rId2"/>
+          <a:stretch>
+            <a:fillRect/>
+          </a:stretch>
+        </p:blipFill>
+        <p:spPr>
+          <a:xfrm>
+            <a:off x="6482888" y="2393761"/>
+            <a:ext cx="3493320" cy="2813737"/>
+          </a:xfrm>
+          <a:prstGeom prst="rect">
+            <a:avLst/>
+          </a:prstGeom>
+        </p:spPr>
+      </p:pic>
     </p:spTree>
     <p:extLst>
       <p:ext uri="{BB962C8B-B14F-4D97-AF65-F5344CB8AC3E}">
-        <p14:creationId xmlns:p14="http://schemas.microsoft.com/office/powerpoint/2010/main" val="2492569615"/>
+        <p14:creationId xmlns:p14="http://schemas.microsoft.com/office/powerpoint/2010/main" val="3725255666"/>
       </p:ext>
     </p:extLst>
   </p:cSld>
   <p:clrMapOvr>
     <a:masterClrMapping/>
   </p:clrMapOvr>
+  <p:timing>
+    <p:tnLst>
+      <p:par>
+        <p:cTn id="1" dur="indefinite" restart="never" nodeType="tmRoot"/>
+      </p:par>
+    </p:tnLst>
+  </p:timing>
 </p:sld>
 </file>
 
@@ -28084,41 +28577,10 @@
           <a:lstStyle/>
           <a:p>
             <a:r>
-              <a:rPr lang="eu-ES" dirty="0" err="1" smtClean="0"/>
-              <a:t>MySQl</a:t>
-            </a:r>
-            <a:r>
               <a:rPr lang="eu-ES" dirty="0" smtClean="0"/>
-              <a:t>-tik </a:t>
-            </a:r>
-            <a:r>
-              <a:rPr lang="eu-ES" dirty="0" err="1" smtClean="0"/>
-              <a:t>oraclera</a:t>
-            </a:r>
-            <a:r>
-              <a:rPr lang="eu-ES" dirty="0" smtClean="0"/>
-              <a:t> migratu</a:t>
+              <a:t>Samba</a:t>
             </a:r>
             <a:endParaRPr lang="es-ES" dirty="0"/>
-          </a:p>
-        </p:txBody>
-      </p:sp>
-      <p:sp>
-        <p:nvSpPr>
-          <p:cNvPr id="3" name="Edukiaren leku-marka 2"/>
-          <p:cNvSpPr>
-            <a:spLocks noGrp="1"/>
-          </p:cNvSpPr>
-          <p:nvPr>
-            <p:ph idx="1"/>
-          </p:nvPr>
-        </p:nvSpPr>
-        <p:spPr/>
-        <p:txBody>
-          <a:bodyPr/>
-          <a:lstStyle/>
-          <a:p>
-            <a:endParaRPr lang="es-ES"/>
           </a:p>
         </p:txBody>
       </p:sp>
@@ -28137,20 +28599,194 @@
           <a:bodyPr/>
           <a:lstStyle/>
           <a:p>
-            <a:endParaRPr lang="es-ES"/>
+            <a:r>
+              <a:rPr lang="eu-ES" dirty="0" smtClean="0"/>
+              <a:t>Karpeta konpartituak</a:t>
+            </a:r>
+            <a:endParaRPr lang="es-ES" dirty="0"/>
           </a:p>
         </p:txBody>
       </p:sp>
+      <p:sp>
+        <p:nvSpPr>
+          <p:cNvPr id="9" name="TestuKoadroa 8"/>
+          <p:cNvSpPr txBox="1"/>
+          <p:nvPr/>
+        </p:nvSpPr>
+        <p:spPr>
+          <a:xfrm>
+            <a:off x="1315092" y="585627"/>
+            <a:ext cx="4623371" cy="646331"/>
+          </a:xfrm>
+          <a:prstGeom prst="rect">
+            <a:avLst/>
+          </a:prstGeom>
+          <a:noFill/>
+        </p:spPr>
+        <p:txBody>
+          <a:bodyPr wrap="square" rtlCol="0">
+            <a:spAutoFit/>
+          </a:bodyPr>
+          <a:lstStyle/>
+          <a:p>
+            <a:r>
+              <a:rPr lang="eu-ES" dirty="0" smtClean="0"/>
+              <a:t>Ubuntu Server-</a:t>
+            </a:r>
+            <a:r>
+              <a:rPr lang="eu-ES" dirty="0" err="1" smtClean="0"/>
+              <a:t>en</a:t>
+            </a:r>
+            <a:r>
+              <a:rPr lang="eu-ES" dirty="0" smtClean="0"/>
+              <a:t> samba instalatu karpeta konpartituak edukitzeko.</a:t>
+            </a:r>
+          </a:p>
+        </p:txBody>
+      </p:sp>
+      <p:pic>
+        <p:nvPicPr>
+          <p:cNvPr id="10" name="Irudia 9"/>
+          <p:cNvPicPr/>
+          <p:nvPr/>
+        </p:nvPicPr>
+        <p:blipFill>
+          <a:blip r:embed="rId2"/>
+          <a:stretch>
+            <a:fillRect/>
+          </a:stretch>
+        </p:blipFill>
+        <p:spPr>
+          <a:xfrm>
+            <a:off x="1070225" y="1508285"/>
+            <a:ext cx="3962400" cy="1019175"/>
+          </a:xfrm>
+          <a:prstGeom prst="rect">
+            <a:avLst/>
+          </a:prstGeom>
+        </p:spPr>
+      </p:pic>
+      <p:sp>
+        <p:nvSpPr>
+          <p:cNvPr id="11" name="TestuKoadroa 10"/>
+          <p:cNvSpPr txBox="1"/>
+          <p:nvPr/>
+        </p:nvSpPr>
+        <p:spPr>
+          <a:xfrm>
+            <a:off x="1199151" y="3152288"/>
+            <a:ext cx="5386583" cy="646331"/>
+          </a:xfrm>
+          <a:prstGeom prst="rect">
+            <a:avLst/>
+          </a:prstGeom>
+          <a:noFill/>
+        </p:spPr>
+        <p:txBody>
+          <a:bodyPr wrap="square" rtlCol="0">
+            <a:spAutoFit/>
+          </a:bodyPr>
+          <a:lstStyle/>
+          <a:p>
+            <a:r>
+              <a:rPr lang="eu-ES" dirty="0" smtClean="0"/>
+              <a:t>Honela </a:t>
+            </a:r>
+            <a:r>
+              <a:rPr lang="eu-ES" dirty="0" err="1" smtClean="0"/>
+              <a:t>windowseko</a:t>
+            </a:r>
+            <a:r>
+              <a:rPr lang="eu-ES" dirty="0" smtClean="0"/>
+              <a:t> bezero batetik karpeta edukitzeko gai izango gara.</a:t>
+            </a:r>
+            <a:endParaRPr lang="es-ES" dirty="0"/>
+          </a:p>
+        </p:txBody>
+      </p:sp>
+      <p:pic>
+        <p:nvPicPr>
+          <p:cNvPr id="12" name="Irudia 11"/>
+          <p:cNvPicPr/>
+          <p:nvPr/>
+        </p:nvPicPr>
+        <p:blipFill>
+          <a:blip r:embed="rId3"/>
+          <a:stretch>
+            <a:fillRect/>
+          </a:stretch>
+        </p:blipFill>
+        <p:spPr>
+          <a:xfrm>
+            <a:off x="56454" y="4552977"/>
+            <a:ext cx="2711614" cy="2222993"/>
+          </a:xfrm>
+          <a:prstGeom prst="rect">
+            <a:avLst/>
+          </a:prstGeom>
+        </p:spPr>
+      </p:pic>
+      <p:pic>
+        <p:nvPicPr>
+          <p:cNvPr id="13" name="Irudia 12"/>
+          <p:cNvPicPr/>
+          <p:nvPr/>
+        </p:nvPicPr>
+        <p:blipFill>
+          <a:blip r:embed="rId4"/>
+          <a:stretch>
+            <a:fillRect/>
+          </a:stretch>
+        </p:blipFill>
+        <p:spPr>
+          <a:xfrm>
+            <a:off x="3051425" y="4296123"/>
+            <a:ext cx="3534309" cy="2222993"/>
+          </a:xfrm>
+          <a:prstGeom prst="rect">
+            <a:avLst/>
+          </a:prstGeom>
+        </p:spPr>
+      </p:pic>
+      <p:pic>
+        <p:nvPicPr>
+          <p:cNvPr id="14" name="Irudia 13"/>
+          <p:cNvPicPr/>
+          <p:nvPr/>
+        </p:nvPicPr>
+        <p:blipFill>
+          <a:blip r:embed="rId5"/>
+          <a:stretch>
+            <a:fillRect/>
+          </a:stretch>
+        </p:blipFill>
+        <p:spPr>
+          <a:xfrm>
+            <a:off x="6747331" y="4648444"/>
+            <a:ext cx="4089826" cy="2032058"/>
+          </a:xfrm>
+          <a:prstGeom prst="rect">
+            <a:avLst/>
+          </a:prstGeom>
+        </p:spPr>
+      </p:pic>
     </p:spTree>
     <p:extLst>
       <p:ext uri="{BB962C8B-B14F-4D97-AF65-F5344CB8AC3E}">
-        <p14:creationId xmlns:p14="http://schemas.microsoft.com/office/powerpoint/2010/main" val="3462591981"/>
+        <p14:creationId xmlns:p14="http://schemas.microsoft.com/office/powerpoint/2010/main" val="1558510660"/>
       </p:ext>
     </p:extLst>
   </p:cSld>
   <p:clrMapOvr>
     <a:masterClrMapping/>
   </p:clrMapOvr>
+  <p:timing>
+    <p:tnLst>
+      <p:par>
+        <p:cTn id="1" dur="indefinite" restart="never" nodeType="tmRoot"/>
+      </p:par>
+    </p:tnLst>
+  </p:timing>
 </p:sld>
 </file>
 

</xml_diff>